<commit_message>
Updating images and notebooks
</commit_message>
<xml_diff>
--- a/Images/fig3.pptx
+++ b/Images/fig3.pptx
@@ -2,7 +2,7 @@
 <file path=ppt/presentation.xml><?xml version="1.0" encoding="utf-8"?>
 <p:presentation xmlns:a="http://schemas.openxmlformats.org/drawingml/2006/main" xmlns:r="http://schemas.openxmlformats.org/officeDocument/2006/relationships" xmlns:p="http://schemas.openxmlformats.org/presentationml/2006/main" saveSubsetFonts="1">
   <p:sldMasterIdLst>
-    <p:sldMasterId id="2147483756" r:id="rId1"/>
+    <p:sldMasterId id="2147483780" r:id="rId1"/>
   </p:sldMasterIdLst>
   <p:notesMasterIdLst>
     <p:notesMasterId r:id="rId3"/>
@@ -10,7 +10,7 @@
   <p:sldIdLst>
     <p:sldId id="256" r:id="rId2"/>
   </p:sldIdLst>
-  <p:sldSz cx="15087600" cy="22860000"/>
+  <p:sldSz cx="15087600" cy="14630400"/>
   <p:notesSz cx="6858000" cy="9144000"/>
   <p:defaultTextStyle>
     <a:defPPr>
@@ -197,7 +197,7 @@
           <a:p>
             <a:fld id="{D34CEA9E-E5A5-49C8-A578-AF124664FEC0}" type="datetimeFigureOut">
               <a:rPr lang="en-US" smtClean="0"/>
-              <a:t>6/21/2021</a:t>
+              <a:t>7/15/2021</a:t>
             </a:fld>
             <a:endParaRPr lang="en-US"/>
           </a:p>
@@ -215,8 +215,8 @@
         </p:nvSpPr>
         <p:spPr>
           <a:xfrm>
-            <a:off x="2411413" y="1143000"/>
-            <a:ext cx="2035175" cy="3086100"/>
+            <a:off x="1838325" y="1143000"/>
+            <a:ext cx="3181350" cy="3086100"/>
           </a:xfrm>
           <a:prstGeom prst="rect">
             <a:avLst/>
@@ -493,8 +493,8 @@
         </p:nvSpPr>
         <p:spPr>
           <a:xfrm>
-            <a:off x="2411413" y="1143000"/>
-            <a:ext cx="2035175" cy="3086100"/>
+            <a:off x="1838325" y="1143000"/>
+            <a:ext cx="3181350" cy="3086100"/>
           </a:xfrm>
         </p:spPr>
       </p:sp>
@@ -582,8 +582,8 @@
         </p:nvSpPr>
         <p:spPr>
           <a:xfrm>
-            <a:off x="1131570" y="3741210"/>
-            <a:ext cx="12824460" cy="7958667"/>
+            <a:off x="1131570" y="2394374"/>
+            <a:ext cx="12824460" cy="5093547"/>
           </a:xfrm>
         </p:spPr>
         <p:txBody>
@@ -614,8 +614,8 @@
         </p:nvSpPr>
         <p:spPr>
           <a:xfrm>
-            <a:off x="1885950" y="12006793"/>
-            <a:ext cx="11315700" cy="5519207"/>
+            <a:off x="1885950" y="7684348"/>
+            <a:ext cx="11315700" cy="3532292"/>
           </a:xfrm>
         </p:spPr>
         <p:txBody>
@@ -684,7 +684,7 @@
           <a:p>
             <a:fld id="{BA05AF01-4F0E-4718-A4C1-DFCBB47EE5F2}" type="datetimeFigureOut">
               <a:rPr lang="en-US" smtClean="0"/>
-              <a:t>6/21/2021</a:t>
+              <a:t>7/15/2021</a:t>
             </a:fld>
             <a:endParaRPr lang="en-US"/>
           </a:p>
@@ -735,7 +735,7 @@
     </p:spTree>
     <p:extLst>
       <p:ext uri="{BB962C8B-B14F-4D97-AF65-F5344CB8AC3E}">
-        <p14:creationId xmlns:p14="http://schemas.microsoft.com/office/powerpoint/2010/main" val="2435769979"/>
+        <p14:creationId xmlns:p14="http://schemas.microsoft.com/office/powerpoint/2010/main" val="3816803182"/>
       </p:ext>
     </p:extLst>
   </p:cSld>
@@ -854,7 +854,7 @@
           <a:p>
             <a:fld id="{BA05AF01-4F0E-4718-A4C1-DFCBB47EE5F2}" type="datetimeFigureOut">
               <a:rPr lang="en-US" smtClean="0"/>
-              <a:t>6/21/2021</a:t>
+              <a:t>7/15/2021</a:t>
             </a:fld>
             <a:endParaRPr lang="en-US"/>
           </a:p>
@@ -905,7 +905,7 @@
     </p:spTree>
     <p:extLst>
       <p:ext uri="{BB962C8B-B14F-4D97-AF65-F5344CB8AC3E}">
-        <p14:creationId xmlns:p14="http://schemas.microsoft.com/office/powerpoint/2010/main" val="789736356"/>
+        <p14:creationId xmlns:p14="http://schemas.microsoft.com/office/powerpoint/2010/main" val="972669064"/>
       </p:ext>
     </p:extLst>
   </p:cSld>
@@ -944,8 +944,8 @@
         </p:nvSpPr>
         <p:spPr>
           <a:xfrm>
-            <a:off x="10797064" y="1217084"/>
-            <a:ext cx="3253264" cy="19372793"/>
+            <a:off x="10797064" y="778933"/>
+            <a:ext cx="3253264" cy="12398588"/>
           </a:xfrm>
         </p:spPr>
         <p:txBody>
@@ -972,8 +972,8 @@
         </p:nvSpPr>
         <p:spPr>
           <a:xfrm>
-            <a:off x="1037273" y="1217084"/>
-            <a:ext cx="9571196" cy="19372793"/>
+            <a:off x="1037273" y="778933"/>
+            <a:ext cx="9571196" cy="12398588"/>
           </a:xfrm>
         </p:spPr>
         <p:txBody>
@@ -1034,7 +1034,7 @@
           <a:p>
             <a:fld id="{BA05AF01-4F0E-4718-A4C1-DFCBB47EE5F2}" type="datetimeFigureOut">
               <a:rPr lang="en-US" smtClean="0"/>
-              <a:t>6/21/2021</a:t>
+              <a:t>7/15/2021</a:t>
             </a:fld>
             <a:endParaRPr lang="en-US"/>
           </a:p>
@@ -1085,7 +1085,7 @@
     </p:spTree>
     <p:extLst>
       <p:ext uri="{BB962C8B-B14F-4D97-AF65-F5344CB8AC3E}">
-        <p14:creationId xmlns:p14="http://schemas.microsoft.com/office/powerpoint/2010/main" val="1370032562"/>
+        <p14:creationId xmlns:p14="http://schemas.microsoft.com/office/powerpoint/2010/main" val="2149096285"/>
       </p:ext>
     </p:extLst>
   </p:cSld>
@@ -1204,7 +1204,7 @@
           <a:p>
             <a:fld id="{BA05AF01-4F0E-4718-A4C1-DFCBB47EE5F2}" type="datetimeFigureOut">
               <a:rPr lang="en-US" smtClean="0"/>
-              <a:t>6/21/2021</a:t>
+              <a:t>7/15/2021</a:t>
             </a:fld>
             <a:endParaRPr lang="en-US"/>
           </a:p>
@@ -1255,7 +1255,7 @@
     </p:spTree>
     <p:extLst>
       <p:ext uri="{BB962C8B-B14F-4D97-AF65-F5344CB8AC3E}">
-        <p14:creationId xmlns:p14="http://schemas.microsoft.com/office/powerpoint/2010/main" val="1357634914"/>
+        <p14:creationId xmlns:p14="http://schemas.microsoft.com/office/powerpoint/2010/main" val="3568581056"/>
       </p:ext>
     </p:extLst>
   </p:cSld>
@@ -1294,8 +1294,8 @@
         </p:nvSpPr>
         <p:spPr>
           <a:xfrm>
-            <a:off x="1029415" y="5699132"/>
-            <a:ext cx="13013055" cy="9509123"/>
+            <a:off x="1029415" y="3647444"/>
+            <a:ext cx="13013055" cy="6085839"/>
           </a:xfrm>
         </p:spPr>
         <p:txBody>
@@ -1326,8 +1326,8 @@
         </p:nvSpPr>
         <p:spPr>
           <a:xfrm>
-            <a:off x="1029415" y="15298215"/>
-            <a:ext cx="13013055" cy="5000623"/>
+            <a:off x="1029415" y="9790858"/>
+            <a:ext cx="13013055" cy="3200399"/>
           </a:xfrm>
         </p:spPr>
         <p:txBody>
@@ -1448,7 +1448,7 @@
           <a:p>
             <a:fld id="{BA05AF01-4F0E-4718-A4C1-DFCBB47EE5F2}" type="datetimeFigureOut">
               <a:rPr lang="en-US" smtClean="0"/>
-              <a:t>6/21/2021</a:t>
+              <a:t>7/15/2021</a:t>
             </a:fld>
             <a:endParaRPr lang="en-US"/>
           </a:p>
@@ -1499,7 +1499,7 @@
     </p:spTree>
     <p:extLst>
       <p:ext uri="{BB962C8B-B14F-4D97-AF65-F5344CB8AC3E}">
-        <p14:creationId xmlns:p14="http://schemas.microsoft.com/office/powerpoint/2010/main" val="601345318"/>
+        <p14:creationId xmlns:p14="http://schemas.microsoft.com/office/powerpoint/2010/main" val="1294018055"/>
       </p:ext>
     </p:extLst>
   </p:cSld>
@@ -1561,8 +1561,8 @@
         </p:nvSpPr>
         <p:spPr>
           <a:xfrm>
-            <a:off x="1037273" y="6085417"/>
-            <a:ext cx="6412230" cy="14504460"/>
+            <a:off x="1037273" y="3894667"/>
+            <a:ext cx="6412230" cy="9282854"/>
           </a:xfrm>
         </p:spPr>
         <p:txBody>
@@ -1618,8 +1618,8 @@
         </p:nvSpPr>
         <p:spPr>
           <a:xfrm>
-            <a:off x="7638098" y="6085417"/>
-            <a:ext cx="6412230" cy="14504460"/>
+            <a:off x="7638098" y="3894667"/>
+            <a:ext cx="6412230" cy="9282854"/>
           </a:xfrm>
         </p:spPr>
         <p:txBody>
@@ -1680,7 +1680,7 @@
           <a:p>
             <a:fld id="{BA05AF01-4F0E-4718-A4C1-DFCBB47EE5F2}" type="datetimeFigureOut">
               <a:rPr lang="en-US" smtClean="0"/>
-              <a:t>6/21/2021</a:t>
+              <a:t>7/15/2021</a:t>
             </a:fld>
             <a:endParaRPr lang="en-US"/>
           </a:p>
@@ -1731,7 +1731,7 @@
     </p:spTree>
     <p:extLst>
       <p:ext uri="{BB962C8B-B14F-4D97-AF65-F5344CB8AC3E}">
-        <p14:creationId xmlns:p14="http://schemas.microsoft.com/office/powerpoint/2010/main" val="3355175570"/>
+        <p14:creationId xmlns:p14="http://schemas.microsoft.com/office/powerpoint/2010/main" val="3266675228"/>
       </p:ext>
     </p:extLst>
   </p:cSld>
@@ -1770,8 +1770,8 @@
         </p:nvSpPr>
         <p:spPr>
           <a:xfrm>
-            <a:off x="1039238" y="1217089"/>
-            <a:ext cx="13013055" cy="4418543"/>
+            <a:off x="1039238" y="778936"/>
+            <a:ext cx="13013055" cy="2827868"/>
           </a:xfrm>
         </p:spPr>
         <p:txBody>
@@ -1798,8 +1798,8 @@
         </p:nvSpPr>
         <p:spPr>
           <a:xfrm>
-            <a:off x="1039239" y="5603877"/>
-            <a:ext cx="6382761" cy="2746373"/>
+            <a:off x="1039239" y="3586481"/>
+            <a:ext cx="6382761" cy="1757679"/>
           </a:xfrm>
         </p:spPr>
         <p:txBody>
@@ -1863,8 +1863,8 @@
         </p:nvSpPr>
         <p:spPr>
           <a:xfrm>
-            <a:off x="1039239" y="8350250"/>
-            <a:ext cx="6382761" cy="12281960"/>
+            <a:off x="1039239" y="5344160"/>
+            <a:ext cx="6382761" cy="7860454"/>
           </a:xfrm>
         </p:spPr>
         <p:txBody>
@@ -1920,8 +1920,8 @@
         </p:nvSpPr>
         <p:spPr>
           <a:xfrm>
-            <a:off x="7638098" y="5603877"/>
-            <a:ext cx="6414195" cy="2746373"/>
+            <a:off x="7638098" y="3586481"/>
+            <a:ext cx="6414195" cy="1757679"/>
           </a:xfrm>
         </p:spPr>
         <p:txBody>
@@ -1985,8 +1985,8 @@
         </p:nvSpPr>
         <p:spPr>
           <a:xfrm>
-            <a:off x="7638098" y="8350250"/>
-            <a:ext cx="6414195" cy="12281960"/>
+            <a:off x="7638098" y="5344160"/>
+            <a:ext cx="6414195" cy="7860454"/>
           </a:xfrm>
         </p:spPr>
         <p:txBody>
@@ -2047,7 +2047,7 @@
           <a:p>
             <a:fld id="{BA05AF01-4F0E-4718-A4C1-DFCBB47EE5F2}" type="datetimeFigureOut">
               <a:rPr lang="en-US" smtClean="0"/>
-              <a:t>6/21/2021</a:t>
+              <a:t>7/15/2021</a:t>
             </a:fld>
             <a:endParaRPr lang="en-US"/>
           </a:p>
@@ -2098,7 +2098,7 @@
     </p:spTree>
     <p:extLst>
       <p:ext uri="{BB962C8B-B14F-4D97-AF65-F5344CB8AC3E}">
-        <p14:creationId xmlns:p14="http://schemas.microsoft.com/office/powerpoint/2010/main" val="994889607"/>
+        <p14:creationId xmlns:p14="http://schemas.microsoft.com/office/powerpoint/2010/main" val="871992586"/>
       </p:ext>
     </p:extLst>
   </p:cSld>
@@ -2165,7 +2165,7 @@
           <a:p>
             <a:fld id="{BA05AF01-4F0E-4718-A4C1-DFCBB47EE5F2}" type="datetimeFigureOut">
               <a:rPr lang="en-US" smtClean="0"/>
-              <a:t>6/21/2021</a:t>
+              <a:t>7/15/2021</a:t>
             </a:fld>
             <a:endParaRPr lang="en-US"/>
           </a:p>
@@ -2216,7 +2216,7 @@
     </p:spTree>
     <p:extLst>
       <p:ext uri="{BB962C8B-B14F-4D97-AF65-F5344CB8AC3E}">
-        <p14:creationId xmlns:p14="http://schemas.microsoft.com/office/powerpoint/2010/main" val="3913881613"/>
+        <p14:creationId xmlns:p14="http://schemas.microsoft.com/office/powerpoint/2010/main" val="3513373074"/>
       </p:ext>
     </p:extLst>
   </p:cSld>
@@ -2260,7 +2260,7 @@
           <a:p>
             <a:fld id="{BA05AF01-4F0E-4718-A4C1-DFCBB47EE5F2}" type="datetimeFigureOut">
               <a:rPr lang="en-US" smtClean="0"/>
-              <a:t>6/21/2021</a:t>
+              <a:t>7/15/2021</a:t>
             </a:fld>
             <a:endParaRPr lang="en-US"/>
           </a:p>
@@ -2311,7 +2311,7 @@
     </p:spTree>
     <p:extLst>
       <p:ext uri="{BB962C8B-B14F-4D97-AF65-F5344CB8AC3E}">
-        <p14:creationId xmlns:p14="http://schemas.microsoft.com/office/powerpoint/2010/main" val="1061805884"/>
+        <p14:creationId xmlns:p14="http://schemas.microsoft.com/office/powerpoint/2010/main" val="3803120226"/>
       </p:ext>
     </p:extLst>
   </p:cSld>
@@ -2350,8 +2350,8 @@
         </p:nvSpPr>
         <p:spPr>
           <a:xfrm>
-            <a:off x="1039238" y="1524000"/>
-            <a:ext cx="4866144" cy="5334000"/>
+            <a:off x="1039238" y="975360"/>
+            <a:ext cx="4866144" cy="3413760"/>
           </a:xfrm>
         </p:spPr>
         <p:txBody>
@@ -2382,8 +2382,8 @@
         </p:nvSpPr>
         <p:spPr>
           <a:xfrm>
-            <a:off x="6414195" y="3291422"/>
-            <a:ext cx="7638098" cy="16245417"/>
+            <a:off x="6414195" y="2106510"/>
+            <a:ext cx="7638098" cy="10397067"/>
           </a:xfrm>
         </p:spPr>
         <p:txBody>
@@ -2467,8 +2467,8 @@
         </p:nvSpPr>
         <p:spPr>
           <a:xfrm>
-            <a:off x="1039238" y="6858000"/>
-            <a:ext cx="4866144" cy="12705293"/>
+            <a:off x="1039238" y="4389120"/>
+            <a:ext cx="4866144" cy="8131388"/>
           </a:xfrm>
         </p:spPr>
         <p:txBody>
@@ -2537,7 +2537,7 @@
           <a:p>
             <a:fld id="{BA05AF01-4F0E-4718-A4C1-DFCBB47EE5F2}" type="datetimeFigureOut">
               <a:rPr lang="en-US" smtClean="0"/>
-              <a:t>6/21/2021</a:t>
+              <a:t>7/15/2021</a:t>
             </a:fld>
             <a:endParaRPr lang="en-US"/>
           </a:p>
@@ -2588,7 +2588,7 @@
     </p:spTree>
     <p:extLst>
       <p:ext uri="{BB962C8B-B14F-4D97-AF65-F5344CB8AC3E}">
-        <p14:creationId xmlns:p14="http://schemas.microsoft.com/office/powerpoint/2010/main" val="3139118278"/>
+        <p14:creationId xmlns:p14="http://schemas.microsoft.com/office/powerpoint/2010/main" val="3327777620"/>
       </p:ext>
     </p:extLst>
   </p:cSld>
@@ -2627,8 +2627,8 @@
         </p:nvSpPr>
         <p:spPr>
           <a:xfrm>
-            <a:off x="1039238" y="1524000"/>
-            <a:ext cx="4866144" cy="5334000"/>
+            <a:off x="1039238" y="975360"/>
+            <a:ext cx="4866144" cy="3413760"/>
           </a:xfrm>
         </p:spPr>
         <p:txBody>
@@ -2659,8 +2659,8 @@
         </p:nvSpPr>
         <p:spPr>
           <a:xfrm>
-            <a:off x="6414195" y="3291422"/>
-            <a:ext cx="7638098" cy="16245417"/>
+            <a:off x="6414195" y="2106510"/>
+            <a:ext cx="7638098" cy="10397067"/>
           </a:xfrm>
         </p:spPr>
         <p:txBody>
@@ -2724,8 +2724,8 @@
         </p:nvSpPr>
         <p:spPr>
           <a:xfrm>
-            <a:off x="1039238" y="6858000"/>
-            <a:ext cx="4866144" cy="12705293"/>
+            <a:off x="1039238" y="4389120"/>
+            <a:ext cx="4866144" cy="8131388"/>
           </a:xfrm>
         </p:spPr>
         <p:txBody>
@@ -2794,7 +2794,7 @@
           <a:p>
             <a:fld id="{BA05AF01-4F0E-4718-A4C1-DFCBB47EE5F2}" type="datetimeFigureOut">
               <a:rPr lang="en-US" smtClean="0"/>
-              <a:t>6/21/2021</a:t>
+              <a:t>7/15/2021</a:t>
             </a:fld>
             <a:endParaRPr lang="en-US"/>
           </a:p>
@@ -2845,7 +2845,7 @@
     </p:spTree>
     <p:extLst>
       <p:ext uri="{BB962C8B-B14F-4D97-AF65-F5344CB8AC3E}">
-        <p14:creationId xmlns:p14="http://schemas.microsoft.com/office/powerpoint/2010/main" val="63532480"/>
+        <p14:creationId xmlns:p14="http://schemas.microsoft.com/office/powerpoint/2010/main" val="4279627970"/>
       </p:ext>
     </p:extLst>
   </p:cSld>
@@ -2889,8 +2889,8 @@
         </p:nvSpPr>
         <p:spPr>
           <a:xfrm>
-            <a:off x="1037273" y="1217089"/>
-            <a:ext cx="13013055" cy="4418543"/>
+            <a:off x="1037273" y="778936"/>
+            <a:ext cx="13013055" cy="2827868"/>
           </a:xfrm>
           <a:prstGeom prst="rect">
             <a:avLst/>
@@ -2922,8 +2922,8 @@
         </p:nvSpPr>
         <p:spPr>
           <a:xfrm>
-            <a:off x="1037273" y="6085417"/>
-            <a:ext cx="13013055" cy="14504460"/>
+            <a:off x="1037273" y="3894667"/>
+            <a:ext cx="13013055" cy="9282854"/>
           </a:xfrm>
           <a:prstGeom prst="rect">
             <a:avLst/>
@@ -2984,8 +2984,8 @@
         </p:nvSpPr>
         <p:spPr>
           <a:xfrm>
-            <a:off x="1037273" y="21187839"/>
-            <a:ext cx="3394710" cy="1217083"/>
+            <a:off x="1037273" y="13560217"/>
+            <a:ext cx="3394710" cy="778933"/>
           </a:xfrm>
           <a:prstGeom prst="rect">
             <a:avLst/>
@@ -3007,7 +3007,7 @@
           <a:p>
             <a:fld id="{BA05AF01-4F0E-4718-A4C1-DFCBB47EE5F2}" type="datetimeFigureOut">
               <a:rPr lang="en-US" smtClean="0"/>
-              <a:t>6/21/2021</a:t>
+              <a:t>7/15/2021</a:t>
             </a:fld>
             <a:endParaRPr lang="en-US"/>
           </a:p>
@@ -3025,8 +3025,8 @@
         </p:nvSpPr>
         <p:spPr>
           <a:xfrm>
-            <a:off x="4997768" y="21187839"/>
-            <a:ext cx="5092065" cy="1217083"/>
+            <a:off x="4997768" y="13560217"/>
+            <a:ext cx="5092065" cy="778933"/>
           </a:xfrm>
           <a:prstGeom prst="rect">
             <a:avLst/>
@@ -3062,8 +3062,8 @@
         </p:nvSpPr>
         <p:spPr>
           <a:xfrm>
-            <a:off x="10655618" y="21187839"/>
-            <a:ext cx="3394710" cy="1217083"/>
+            <a:off x="10655618" y="13560217"/>
+            <a:ext cx="3394710" cy="778933"/>
           </a:xfrm>
           <a:prstGeom prst="rect">
             <a:avLst/>
@@ -3094,23 +3094,23 @@
     </p:spTree>
     <p:extLst>
       <p:ext uri="{BB962C8B-B14F-4D97-AF65-F5344CB8AC3E}">
-        <p14:creationId xmlns:p14="http://schemas.microsoft.com/office/powerpoint/2010/main" val="1362040613"/>
+        <p14:creationId xmlns:p14="http://schemas.microsoft.com/office/powerpoint/2010/main" val="2423885076"/>
       </p:ext>
     </p:extLst>
   </p:cSld>
   <p:clrMap bg1="lt1" tx1="dk1" bg2="lt2" tx2="dk2" accent1="accent1" accent2="accent2" accent3="accent3" accent4="accent4" accent5="accent5" accent6="accent6" hlink="hlink" folHlink="folHlink"/>
   <p:sldLayoutIdLst>
-    <p:sldLayoutId id="2147483757" r:id="rId1"/>
-    <p:sldLayoutId id="2147483758" r:id="rId2"/>
-    <p:sldLayoutId id="2147483759" r:id="rId3"/>
-    <p:sldLayoutId id="2147483760" r:id="rId4"/>
-    <p:sldLayoutId id="2147483761" r:id="rId5"/>
-    <p:sldLayoutId id="2147483762" r:id="rId6"/>
-    <p:sldLayoutId id="2147483763" r:id="rId7"/>
-    <p:sldLayoutId id="2147483764" r:id="rId8"/>
-    <p:sldLayoutId id="2147483765" r:id="rId9"/>
-    <p:sldLayoutId id="2147483766" r:id="rId10"/>
-    <p:sldLayoutId id="2147483767" r:id="rId11"/>
+    <p:sldLayoutId id="2147483781" r:id="rId1"/>
+    <p:sldLayoutId id="2147483782" r:id="rId2"/>
+    <p:sldLayoutId id="2147483783" r:id="rId3"/>
+    <p:sldLayoutId id="2147483784" r:id="rId4"/>
+    <p:sldLayoutId id="2147483785" r:id="rId5"/>
+    <p:sldLayoutId id="2147483786" r:id="rId6"/>
+    <p:sldLayoutId id="2147483787" r:id="rId7"/>
+    <p:sldLayoutId id="2147483788" r:id="rId8"/>
+    <p:sldLayoutId id="2147483789" r:id="rId9"/>
+    <p:sldLayoutId id="2147483790" r:id="rId10"/>
+    <p:sldLayoutId id="2147483791" r:id="rId11"/>
   </p:sldLayoutIdLst>
   <p:txStyles>
     <p:titleStyle>
@@ -3434,7 +3434,7 @@
         </p:blipFill>
         <p:spPr>
           <a:xfrm>
-            <a:off x="124717" y="5604590"/>
+            <a:off x="207343" y="5515613"/>
             <a:ext cx="3480051" cy="8176812"/>
           </a:xfrm>
           <a:prstGeom prst="rect">
@@ -3456,7 +3456,7 @@
         </p:nvGrpSpPr>
         <p:grpSpPr>
           <a:xfrm>
-            <a:off x="3604768" y="5604590"/>
+            <a:off x="3742636" y="5515613"/>
             <a:ext cx="11158838" cy="8478598"/>
             <a:chOff x="3928762" y="4701489"/>
             <a:chExt cx="11158838" cy="8478598"/>
@@ -3988,181 +3988,6 @@
           </p:spPr>
         </p:pic>
       </p:grpSp>
-      <p:grpSp>
-        <p:nvGrpSpPr>
-          <p:cNvPr id="49" name="Group 48">
-            <a:extLst>
-              <a:ext uri="{FF2B5EF4-FFF2-40B4-BE49-F238E27FC236}">
-                <a16:creationId xmlns:a16="http://schemas.microsoft.com/office/drawing/2014/main" id="{23458FB8-8EE1-42F4-95B8-187D88272BF6}"/>
-              </a:ext>
-            </a:extLst>
-          </p:cNvPr>
-          <p:cNvGrpSpPr/>
-          <p:nvPr/>
-        </p:nvGrpSpPr>
-        <p:grpSpPr>
-          <a:xfrm>
-            <a:off x="213372" y="14064718"/>
-            <a:ext cx="14660855" cy="8283618"/>
-            <a:chOff x="65533" y="13665619"/>
-            <a:chExt cx="14660855" cy="8283618"/>
-          </a:xfrm>
-        </p:grpSpPr>
-        <p:sp>
-          <p:nvSpPr>
-            <p:cNvPr id="43" name="TextBox 42">
-              <a:extLst>
-                <a:ext uri="{FF2B5EF4-FFF2-40B4-BE49-F238E27FC236}">
-                  <a16:creationId xmlns:a16="http://schemas.microsoft.com/office/drawing/2014/main" id="{7DCE2DD7-B4B3-4ACA-A684-527A99BB3185}"/>
-                </a:ext>
-              </a:extLst>
-            </p:cNvPr>
-            <p:cNvSpPr txBox="1"/>
-            <p:nvPr/>
-          </p:nvSpPr>
-          <p:spPr>
-            <a:xfrm>
-              <a:off x="6442762" y="21579905"/>
-              <a:ext cx="2918491" cy="369332"/>
-            </a:xfrm>
-            <a:prstGeom prst="rect">
-              <a:avLst/>
-            </a:prstGeom>
-            <a:solidFill>
-              <a:schemeClr val="bg1"/>
-            </a:solidFill>
-          </p:spPr>
-          <p:txBody>
-            <a:bodyPr wrap="none" rtlCol="0">
-              <a:spAutoFit/>
-            </a:bodyPr>
-            <a:lstStyle/>
-            <a:p>
-              <a:r>
-                <a:rPr lang="en-US" dirty="0">
-                  <a:latin typeface="Times New Roman" panose="02020603050405020304" pitchFamily="18" charset="0"/>
-                  <a:cs typeface="Times New Roman" panose="02020603050405020304" pitchFamily="18" charset="0"/>
-                </a:rPr>
-                <a:t>Binding Affinity in kcal/mole</a:t>
-              </a:r>
-            </a:p>
-          </p:txBody>
-        </p:sp>
-        <p:pic>
-          <p:nvPicPr>
-            <p:cNvPr id="48" name="Picture 47" descr="Chart, histogram&#10;&#10;Description automatically generated">
-              <a:extLst>
-                <a:ext uri="{FF2B5EF4-FFF2-40B4-BE49-F238E27FC236}">
-                  <a16:creationId xmlns:a16="http://schemas.microsoft.com/office/drawing/2014/main" id="{57453497-9906-4B5C-96BA-241A0E86D44C}"/>
-                </a:ext>
-              </a:extLst>
-            </p:cNvPr>
-            <p:cNvPicPr>
-              <a:picLocks noChangeAspect="1"/>
-            </p:cNvPicPr>
-            <p:nvPr/>
-          </p:nvPicPr>
-          <p:blipFill>
-            <a:blip r:embed="rId8">
-              <a:extLst>
-                <a:ext uri="{28A0092B-C50C-407E-A947-70E740481C1C}">
-                  <a14:useLocalDpi xmlns:a14="http://schemas.microsoft.com/office/drawing/2010/main" val="0"/>
-                </a:ext>
-              </a:extLst>
-            </a:blip>
-            <a:stretch>
-              <a:fillRect/>
-            </a:stretch>
-          </p:blipFill>
-          <p:spPr>
-            <a:xfrm>
-              <a:off x="250198" y="13665619"/>
-              <a:ext cx="14476190" cy="7914286"/>
-            </a:xfrm>
-            <a:prstGeom prst="rect">
-              <a:avLst/>
-            </a:prstGeom>
-          </p:spPr>
-        </p:pic>
-        <p:sp>
-          <p:nvSpPr>
-            <p:cNvPr id="120" name="TextBox 119">
-              <a:extLst>
-                <a:ext uri="{FF2B5EF4-FFF2-40B4-BE49-F238E27FC236}">
-                  <a16:creationId xmlns:a16="http://schemas.microsoft.com/office/drawing/2014/main" id="{17ABDFCA-0C28-46A0-A0EC-B0D341154A1D}"/>
-                </a:ext>
-              </a:extLst>
-            </p:cNvPr>
-            <p:cNvSpPr txBox="1"/>
-            <p:nvPr/>
-          </p:nvSpPr>
-          <p:spPr>
-            <a:xfrm rot="16200000">
-              <a:off x="-53731" y="17379995"/>
-              <a:ext cx="607859" cy="369332"/>
-            </a:xfrm>
-            <a:prstGeom prst="rect">
-              <a:avLst/>
-            </a:prstGeom>
-            <a:solidFill>
-              <a:schemeClr val="bg1"/>
-            </a:solidFill>
-          </p:spPr>
-          <p:txBody>
-            <a:bodyPr wrap="none" rtlCol="0">
-              <a:spAutoFit/>
-            </a:bodyPr>
-            <a:lstStyle/>
-            <a:p>
-              <a:r>
-                <a:rPr lang="en-US" dirty="0">
-                  <a:latin typeface="Times New Roman" panose="02020603050405020304" pitchFamily="18" charset="0"/>
-                  <a:cs typeface="Times New Roman" panose="02020603050405020304" pitchFamily="18" charset="0"/>
-                </a:rPr>
-                <a:t>PDF</a:t>
-              </a:r>
-            </a:p>
-          </p:txBody>
-        </p:sp>
-      </p:grpSp>
-      <p:sp>
-        <p:nvSpPr>
-          <p:cNvPr id="52" name="TextBox 51">
-            <a:extLst>
-              <a:ext uri="{FF2B5EF4-FFF2-40B4-BE49-F238E27FC236}">
-                <a16:creationId xmlns:a16="http://schemas.microsoft.com/office/drawing/2014/main" id="{6A078558-F2EC-4075-A219-D678D16B2F8F}"/>
-              </a:ext>
-            </a:extLst>
-          </p:cNvPr>
-          <p:cNvSpPr txBox="1"/>
-          <p:nvPr/>
-        </p:nvSpPr>
-        <p:spPr>
-          <a:xfrm>
-            <a:off x="186657" y="13978214"/>
-            <a:ext cx="792094" cy="523220"/>
-          </a:xfrm>
-          <a:prstGeom prst="rect">
-            <a:avLst/>
-          </a:prstGeom>
-          <a:noFill/>
-        </p:spPr>
-        <p:txBody>
-          <a:bodyPr wrap="square" rtlCol="0">
-            <a:spAutoFit/>
-          </a:bodyPr>
-          <a:lstStyle/>
-          <a:p>
-            <a:r>
-              <a:rPr lang="en-US" sz="2800" b="1" dirty="0">
-                <a:latin typeface="Times New Roman" panose="02020603050405020304" pitchFamily="18" charset="0"/>
-                <a:cs typeface="Times New Roman" panose="02020603050405020304" pitchFamily="18" charset="0"/>
-              </a:rPr>
-              <a:t>d</a:t>
-            </a:r>
-          </a:p>
-        </p:txBody>
-      </p:sp>
       <p:sp>
         <p:nvSpPr>
           <p:cNvPr id="124" name="TextBox 123">
@@ -4177,7 +4002,7 @@
         </p:nvSpPr>
         <p:spPr>
           <a:xfrm>
-            <a:off x="211088" y="5099840"/>
+            <a:off x="47811" y="5254003"/>
             <a:ext cx="385042" cy="523220"/>
           </a:xfrm>
           <a:prstGeom prst="rect">
@@ -4215,7 +4040,7 @@
         </p:nvSpPr>
         <p:spPr>
           <a:xfrm>
-            <a:off x="3645346" y="5076883"/>
+            <a:off x="3640083" y="5272473"/>
             <a:ext cx="343364" cy="523220"/>
           </a:xfrm>
           <a:prstGeom prst="rect">
@@ -4253,7 +4078,7 @@
         </p:nvSpPr>
         <p:spPr>
           <a:xfrm>
-            <a:off x="330853" y="200078"/>
+            <a:off x="90719" y="120388"/>
             <a:ext cx="364202" cy="523220"/>
           </a:xfrm>
           <a:prstGeom prst="rect">
@@ -4292,7 +4117,7 @@
           <p:nvPr/>
         </p:nvPicPr>
         <p:blipFill>
-          <a:blip r:embed="rId9">
+          <a:blip r:embed="rId8">
             <a:extLst>
               <a:ext uri="{28A0092B-C50C-407E-A947-70E740481C1C}">
                 <a14:useLocalDpi xmlns:a14="http://schemas.microsoft.com/office/drawing/2010/main" val="0"/>
@@ -4305,7 +4130,7 @@
         </p:blipFill>
         <p:spPr>
           <a:xfrm>
-            <a:off x="475263" y="726095"/>
+            <a:off x="716361" y="643608"/>
             <a:ext cx="14137073" cy="4277322"/>
           </a:xfrm>
           <a:prstGeom prst="rect">

</xml_diff>

<commit_message>
Updating figures and README
</commit_message>
<xml_diff>
--- a/Images/fig3.pptx
+++ b/Images/fig3.pptx
@@ -197,7 +197,7 @@
           <a:p>
             <a:fld id="{D34CEA9E-E5A5-49C8-A578-AF124664FEC0}" type="datetimeFigureOut">
               <a:rPr lang="en-US" smtClean="0"/>
-              <a:t>11/9/2021</a:t>
+              <a:t>11/23/2021</a:t>
             </a:fld>
             <a:endParaRPr lang="en-US"/>
           </a:p>
@@ -684,7 +684,7 @@
           <a:p>
             <a:fld id="{BA05AF01-4F0E-4718-A4C1-DFCBB47EE5F2}" type="datetimeFigureOut">
               <a:rPr lang="en-US" smtClean="0"/>
-              <a:t>11/9/2021</a:t>
+              <a:t>11/23/2021</a:t>
             </a:fld>
             <a:endParaRPr lang="en-US"/>
           </a:p>
@@ -854,7 +854,7 @@
           <a:p>
             <a:fld id="{BA05AF01-4F0E-4718-A4C1-DFCBB47EE5F2}" type="datetimeFigureOut">
               <a:rPr lang="en-US" smtClean="0"/>
-              <a:t>11/9/2021</a:t>
+              <a:t>11/23/2021</a:t>
             </a:fld>
             <a:endParaRPr lang="en-US"/>
           </a:p>
@@ -1034,7 +1034,7 @@
           <a:p>
             <a:fld id="{BA05AF01-4F0E-4718-A4C1-DFCBB47EE5F2}" type="datetimeFigureOut">
               <a:rPr lang="en-US" smtClean="0"/>
-              <a:t>11/9/2021</a:t>
+              <a:t>11/23/2021</a:t>
             </a:fld>
             <a:endParaRPr lang="en-US"/>
           </a:p>
@@ -1204,7 +1204,7 @@
           <a:p>
             <a:fld id="{BA05AF01-4F0E-4718-A4C1-DFCBB47EE5F2}" type="datetimeFigureOut">
               <a:rPr lang="en-US" smtClean="0"/>
-              <a:t>11/9/2021</a:t>
+              <a:t>11/23/2021</a:t>
             </a:fld>
             <a:endParaRPr lang="en-US"/>
           </a:p>
@@ -1448,7 +1448,7 @@
           <a:p>
             <a:fld id="{BA05AF01-4F0E-4718-A4C1-DFCBB47EE5F2}" type="datetimeFigureOut">
               <a:rPr lang="en-US" smtClean="0"/>
-              <a:t>11/9/2021</a:t>
+              <a:t>11/23/2021</a:t>
             </a:fld>
             <a:endParaRPr lang="en-US"/>
           </a:p>
@@ -1680,7 +1680,7 @@
           <a:p>
             <a:fld id="{BA05AF01-4F0E-4718-A4C1-DFCBB47EE5F2}" type="datetimeFigureOut">
               <a:rPr lang="en-US" smtClean="0"/>
-              <a:t>11/9/2021</a:t>
+              <a:t>11/23/2021</a:t>
             </a:fld>
             <a:endParaRPr lang="en-US"/>
           </a:p>
@@ -2047,7 +2047,7 @@
           <a:p>
             <a:fld id="{BA05AF01-4F0E-4718-A4C1-DFCBB47EE5F2}" type="datetimeFigureOut">
               <a:rPr lang="en-US" smtClean="0"/>
-              <a:t>11/9/2021</a:t>
+              <a:t>11/23/2021</a:t>
             </a:fld>
             <a:endParaRPr lang="en-US"/>
           </a:p>
@@ -2165,7 +2165,7 @@
           <a:p>
             <a:fld id="{BA05AF01-4F0E-4718-A4C1-DFCBB47EE5F2}" type="datetimeFigureOut">
               <a:rPr lang="en-US" smtClean="0"/>
-              <a:t>11/9/2021</a:t>
+              <a:t>11/23/2021</a:t>
             </a:fld>
             <a:endParaRPr lang="en-US"/>
           </a:p>
@@ -2260,7 +2260,7 @@
           <a:p>
             <a:fld id="{BA05AF01-4F0E-4718-A4C1-DFCBB47EE5F2}" type="datetimeFigureOut">
               <a:rPr lang="en-US" smtClean="0"/>
-              <a:t>11/9/2021</a:t>
+              <a:t>11/23/2021</a:t>
             </a:fld>
             <a:endParaRPr lang="en-US"/>
           </a:p>
@@ -2537,7 +2537,7 @@
           <a:p>
             <a:fld id="{BA05AF01-4F0E-4718-A4C1-DFCBB47EE5F2}" type="datetimeFigureOut">
               <a:rPr lang="en-US" smtClean="0"/>
-              <a:t>11/9/2021</a:t>
+              <a:t>11/23/2021</a:t>
             </a:fld>
             <a:endParaRPr lang="en-US"/>
           </a:p>
@@ -2794,7 +2794,7 @@
           <a:p>
             <a:fld id="{BA05AF01-4F0E-4718-A4C1-DFCBB47EE5F2}" type="datetimeFigureOut">
               <a:rPr lang="en-US" smtClean="0"/>
-              <a:t>11/9/2021</a:t>
+              <a:t>11/23/2021</a:t>
             </a:fld>
             <a:endParaRPr lang="en-US"/>
           </a:p>
@@ -3007,7 +3007,7 @@
           <a:p>
             <a:fld id="{BA05AF01-4F0E-4718-A4C1-DFCBB47EE5F2}" type="datetimeFigureOut">
               <a:rPr lang="en-US" smtClean="0"/>
-              <a:t>11/9/2021</a:t>
+              <a:t>11/23/2021</a:t>
             </a:fld>
             <a:endParaRPr lang="en-US"/>
           </a:p>
@@ -4147,7 +4147,7 @@
         </p:nvSpPr>
         <p:spPr>
           <a:xfrm>
-            <a:off x="8954242" y="11090871"/>
+            <a:off x="8936286" y="11076328"/>
             <a:ext cx="1038157" cy="261482"/>
           </a:xfrm>
           <a:prstGeom prst="rect">
@@ -4547,7 +4547,7 @@
         </p:nvSpPr>
         <p:spPr>
           <a:xfrm>
-            <a:off x="5140084" y="15067911"/>
+            <a:off x="5152327" y="15039417"/>
             <a:ext cx="1038157" cy="261482"/>
           </a:xfrm>
           <a:prstGeom prst="rect">

</xml_diff>